<commit_message>
Deployed be0d9f5 to 0.7 with MkDocs 1.2.2 and mike 1.1.1
</commit_message>
<xml_diff>
--- a/0.7/images/src/slack-image.pptx
+++ b/0.7/images/src/slack-image.pptx
@@ -197,7 +197,7 @@
           <a:p>
             <a:fld id="{38B78CBE-37FA-D241-BB4C-CAC5D3B25F49}" type="datetimeFigureOut">
               <a:rPr lang="en-US" smtClean="0"/>
-              <a:t>7/21/21</a:t>
+              <a:t>9/24/21</a:t>
             </a:fld>
             <a:endParaRPr lang="en-US"/>
           </a:p>
@@ -695,7 +695,7 @@
           <a:p>
             <a:fld id="{708812C5-0212-FD42-A0D4-E2E8FF4E3AF5}" type="datetime1">
               <a:rPr lang="en-US" smtClean="0"/>
-              <a:t>7/21/21</a:t>
+              <a:t>9/24/21</a:t>
             </a:fld>
             <a:endParaRPr lang="en-US"/>
           </a:p>
@@ -896,7 +896,7 @@
           <a:p>
             <a:fld id="{D232AC6F-41C3-B34B-9BAA-03ED2F3BC0F6}" type="datetime1">
               <a:rPr lang="en-US" smtClean="0"/>
-              <a:t>7/21/21</a:t>
+              <a:t>9/24/21</a:t>
             </a:fld>
             <a:endParaRPr lang="en-US"/>
           </a:p>
@@ -1107,7 +1107,7 @@
           <a:p>
             <a:fld id="{BEE140C2-F440-9D49-95CB-5965D64CC4A2}" type="datetime1">
               <a:rPr lang="en-US" smtClean="0"/>
-              <a:t>7/21/21</a:t>
+              <a:t>9/24/21</a:t>
             </a:fld>
             <a:endParaRPr lang="en-US"/>
           </a:p>
@@ -1308,7 +1308,7 @@
           <a:p>
             <a:fld id="{CC99F980-FB29-FD47-8508-150F73F1E8B0}" type="datetime1">
               <a:rPr lang="en-US" smtClean="0"/>
-              <a:t>7/21/21</a:t>
+              <a:t>9/24/21</a:t>
             </a:fld>
             <a:endParaRPr lang="en-US"/>
           </a:p>
@@ -1586,7 +1586,7 @@
           <a:p>
             <a:fld id="{D4510983-EA22-9643-8AC0-B3C6499B643B}" type="datetime1">
               <a:rPr lang="en-US" smtClean="0"/>
-              <a:t>7/21/21</a:t>
+              <a:t>9/24/21</a:t>
             </a:fld>
             <a:endParaRPr lang="en-US"/>
           </a:p>
@@ -1854,7 +1854,7 @@
           <a:p>
             <a:fld id="{D5A39195-967D-5D4E-8C6A-C99866996458}" type="datetime1">
               <a:rPr lang="en-US" smtClean="0"/>
-              <a:t>7/21/21</a:t>
+              <a:t>9/24/21</a:t>
             </a:fld>
             <a:endParaRPr lang="en-US"/>
           </a:p>
@@ -2269,7 +2269,7 @@
           <a:p>
             <a:fld id="{5AD771E9-C79D-684D-A158-5EB6E92DE947}" type="datetime1">
               <a:rPr lang="en-US" smtClean="0"/>
-              <a:t>7/21/21</a:t>
+              <a:t>9/24/21</a:t>
             </a:fld>
             <a:endParaRPr lang="en-US"/>
           </a:p>
@@ -2413,7 +2413,7 @@
           <a:p>
             <a:fld id="{693CA161-7E4C-5C4B-B799-DB602A0B9806}" type="datetime1">
               <a:rPr lang="en-US" smtClean="0"/>
-              <a:t>7/21/21</a:t>
+              <a:t>9/24/21</a:t>
             </a:fld>
             <a:endParaRPr lang="en-US"/>
           </a:p>
@@ -2529,7 +2529,7 @@
           <a:p>
             <a:fld id="{6D55FDF3-8BB2-6349-A5FA-057F3D78953D}" type="datetime1">
               <a:rPr lang="en-US" smtClean="0"/>
-              <a:t>7/21/21</a:t>
+              <a:t>9/24/21</a:t>
             </a:fld>
             <a:endParaRPr lang="en-US"/>
           </a:p>
@@ -2843,7 +2843,7 @@
           <a:p>
             <a:fld id="{EEDFACC0-3228-BA4B-942E-CEF38B0101FD}" type="datetime1">
               <a:rPr lang="en-US" smtClean="0"/>
-              <a:t>7/21/21</a:t>
+              <a:t>9/24/21</a:t>
             </a:fld>
             <a:endParaRPr lang="en-US"/>
           </a:p>
@@ -3134,7 +3134,7 @@
           <a:p>
             <a:fld id="{07EEEDBE-E24C-D140-B419-6D8D592D0F1C}" type="datetime1">
               <a:rPr lang="en-US" smtClean="0"/>
-              <a:t>7/21/21</a:t>
+              <a:t>9/24/21</a:t>
             </a:fld>
             <a:endParaRPr lang="en-US"/>
           </a:p>
@@ -3378,7 +3378,7 @@
           <a:p>
             <a:fld id="{E05781A2-A5EF-C54C-A3EF-F62483D37EDC}" type="datetime1">
               <a:rPr lang="en-US" smtClean="0"/>
-              <a:t>7/21/21</a:t>
+              <a:t>9/24/21</a:t>
             </a:fld>
             <a:endParaRPr lang="en-US"/>
           </a:p>
@@ -3801,10 +3801,10 @@
       </p:grpSpPr>
       <p:sp>
         <p:nvSpPr>
-          <p:cNvPr id="10" name="Oval 9">
-            <a:extLst>
-              <a:ext uri="{FF2B5EF4-FFF2-40B4-BE49-F238E27FC236}">
-                <a16:creationId xmlns:a16="http://schemas.microsoft.com/office/drawing/2014/main" id="{5BAB0A1A-CB02-9B4B-A948-D02EBC1BC335}"/>
+          <p:cNvPr id="2" name="Rounded Rectangle 1">
+            <a:extLst>
+              <a:ext uri="{FF2B5EF4-FFF2-40B4-BE49-F238E27FC236}">
+                <a16:creationId xmlns:a16="http://schemas.microsoft.com/office/drawing/2014/main" id="{89B5AB22-3BFC-D044-8340-ABEC8F555151}"/>
               </a:ext>
             </a:extLst>
           </p:cNvPr>
@@ -3813,8 +3813,60 @@
         </p:nvSpPr>
         <p:spPr>
           <a:xfrm>
-            <a:off x="2974429" y="2501463"/>
-            <a:ext cx="1481958" cy="1481791"/>
+            <a:off x="3972910" y="2191051"/>
+            <a:ext cx="4908331" cy="1960534"/>
+          </a:xfrm>
+          <a:prstGeom prst="roundRect">
+            <a:avLst/>
+          </a:prstGeom>
+          <a:noFill/>
+          <a:ln>
+            <a:noFill/>
+          </a:ln>
+        </p:spPr>
+        <p:style>
+          <a:lnRef idx="2">
+            <a:schemeClr val="accent1">
+              <a:shade val="50000"/>
+            </a:schemeClr>
+          </a:lnRef>
+          <a:fillRef idx="1">
+            <a:schemeClr val="accent1"/>
+          </a:fillRef>
+          <a:effectRef idx="0">
+            <a:schemeClr val="accent1"/>
+          </a:effectRef>
+          <a:fontRef idx="minor">
+            <a:schemeClr val="lt1"/>
+          </a:fontRef>
+        </p:style>
+        <p:txBody>
+          <a:bodyPr rtlCol="0" anchor="ctr"/>
+          <a:lstStyle/>
+          <a:p>
+            <a:pPr algn="ctr"/>
+            <a:endParaRPr lang="en-US" dirty="0"/>
+          </a:p>
+        </p:txBody>
+      </p:sp>
+      <p:sp>
+        <p:nvSpPr>
+          <p:cNvPr id="10" name="Oval 9">
+            <a:extLst>
+              <a:ext uri="{FF2B5EF4-FFF2-40B4-BE49-F238E27FC236}">
+                <a16:creationId xmlns:a16="http://schemas.microsoft.com/office/drawing/2014/main" id="{5BAB0A1A-CB02-9B4B-A948-D02EBC1BC335}"/>
+              </a:ext>
+            </a:extLst>
+          </p:cNvPr>
+          <p:cNvSpPr>
+            <a:spLocks noChangeAspect="1"/>
+          </p:cNvSpPr>
+          <p:nvPr/>
+        </p:nvSpPr>
+        <p:spPr>
+          <a:xfrm>
+            <a:off x="5922589" y="2677627"/>
+            <a:ext cx="1115568" cy="1118950"/>
           </a:xfrm>
           <a:prstGeom prst="ellipse">
             <a:avLst/>
@@ -3888,8 +3940,8 @@
         </p:blipFill>
         <p:spPr>
           <a:xfrm>
-            <a:off x="3234925" y="2751366"/>
-            <a:ext cx="971473" cy="971473"/>
+            <a:off x="6107735" y="2864067"/>
+            <a:ext cx="746070" cy="746070"/>
           </a:xfrm>
           <a:prstGeom prst="rect">
             <a:avLst/>
@@ -3979,7 +4031,7 @@
         </p:blipFill>
         <p:spPr bwMode="auto">
           <a:xfrm>
-            <a:off x="7190566" y="2693456"/>
+            <a:off x="4141250" y="2302648"/>
             <a:ext cx="494256" cy="494256"/>
           </a:xfrm>
           <a:prstGeom prst="rect">
@@ -4073,7 +4125,7 @@
         </p:blipFill>
         <p:spPr bwMode="auto">
           <a:xfrm flipH="1">
-            <a:off x="5931090" y="2801607"/>
+            <a:off x="7185603" y="2817924"/>
             <a:ext cx="494255" cy="494255"/>
           </a:xfrm>
           <a:prstGeom prst="rect">
@@ -4119,7 +4171,7 @@
         </p:blipFill>
         <p:spPr>
           <a:xfrm>
-            <a:off x="6425345" y="2278132"/>
+            <a:off x="6755646" y="2243601"/>
             <a:ext cx="552673" cy="527803"/>
           </a:xfrm>
           <a:prstGeom prst="rect">
@@ -4227,7 +4279,7 @@
         </p:blipFill>
         <p:spPr>
           <a:xfrm>
-            <a:off x="6117224" y="3424621"/>
+            <a:off x="7096908" y="3534028"/>
             <a:ext cx="465279" cy="485239"/>
           </a:xfrm>
           <a:prstGeom prst="rect">
@@ -4263,7 +4315,7 @@
         </p:blipFill>
         <p:spPr>
           <a:xfrm>
-            <a:off x="6555988" y="2945092"/>
+            <a:off x="8043282" y="3527702"/>
             <a:ext cx="467334" cy="485240"/>
           </a:xfrm>
           <a:prstGeom prst="rect">
@@ -4299,7 +4351,7 @@
         </p:blipFill>
         <p:spPr>
           <a:xfrm>
-            <a:off x="4595473" y="2597090"/>
+            <a:off x="4637670" y="2782100"/>
             <a:ext cx="552675" cy="552675"/>
           </a:xfrm>
           <a:prstGeom prst="rect">
@@ -4335,7 +4387,7 @@
         </p:blipFill>
         <p:spPr>
           <a:xfrm>
-            <a:off x="7037262" y="3481354"/>
+            <a:off x="4049856" y="2963291"/>
             <a:ext cx="426623" cy="491178"/>
           </a:xfrm>
           <a:prstGeom prst="rect">
@@ -4371,7 +4423,7 @@
         </p:blipFill>
         <p:spPr>
           <a:xfrm>
-            <a:off x="7684822" y="3238905"/>
+            <a:off x="7796154" y="2934744"/>
             <a:ext cx="494256" cy="494256"/>
           </a:xfrm>
           <a:prstGeom prst="rect">
@@ -4407,12 +4459,59 @@
         </p:blipFill>
         <p:spPr>
           <a:xfrm>
-            <a:off x="7921913" y="2385028"/>
+            <a:off x="7785644" y="2284754"/>
             <a:ext cx="333302" cy="494255"/>
           </a:xfrm>
           <a:prstGeom prst="rect">
             <a:avLst/>
           </a:prstGeom>
+        </p:spPr>
+      </p:pic>
+      <p:pic>
+        <p:nvPicPr>
+          <p:cNvPr id="1028" name="Picture 4" descr="Litmus Chaos · GitHub">
+            <a:extLst>
+              <a:ext uri="{FF2B5EF4-FFF2-40B4-BE49-F238E27FC236}">
+                <a16:creationId xmlns:a16="http://schemas.microsoft.com/office/drawing/2014/main" id="{D09B515A-A384-DB45-924F-4D9F25786FFD}"/>
+              </a:ext>
+            </a:extLst>
+          </p:cNvPr>
+          <p:cNvPicPr>
+            <a:picLocks noChangeAspect="1" noChangeArrowheads="1"/>
+          </p:cNvPicPr>
+          <p:nvPr/>
+        </p:nvPicPr>
+        <p:blipFill>
+          <a:blip r:embed="rId27">
+            <a:extLst>
+              <a:ext uri="{28A0092B-C50C-407E-A947-70E740481C1C}">
+                <a14:useLocalDpi xmlns:a14="http://schemas.microsoft.com/office/drawing/2010/main" val="0"/>
+              </a:ext>
+            </a:extLst>
+          </a:blip>
+          <a:srcRect/>
+          <a:stretch>
+            <a:fillRect/>
+          </a:stretch>
+        </p:blipFill>
+        <p:spPr bwMode="auto">
+          <a:xfrm>
+            <a:off x="8408704" y="2582651"/>
+            <a:ext cx="428506" cy="428506"/>
+          </a:xfrm>
+          <a:prstGeom prst="rect">
+            <a:avLst/>
+          </a:prstGeom>
+          <a:noFill/>
+          <a:extLst>
+            <a:ext uri="{909E8E84-426E-40DD-AFC4-6F175D3DCCD1}">
+              <a14:hiddenFill xmlns:a14="http://schemas.microsoft.com/office/drawing/2010/main">
+                <a:solidFill>
+                  <a:srgbClr val="FFFFFF"/>
+                </a:solidFill>
+              </a14:hiddenFill>
+            </a:ext>
+          </a:extLst>
         </p:spPr>
       </p:pic>
     </p:spTree>

</xml_diff>